<commit_message>
Fixup security talk typos
</commit_message>
<xml_diff>
--- a/docs/materials/day2/files/osgus19-day2-part2-security.pptx
+++ b/docs/materials/day2/files/osgus19-day2-part2-security.pptx
@@ -22808,7 +22808,7 @@
                   <a:srgbClr val="000080"/>
                 </a:solidFill>
               </a:rPr>
-              <a:t>Real word:</a:t>
+              <a:t>Real world:</a:t>
             </a:r>
             <a:r>
               <a:rPr lang="en" sz="2400">
@@ -23799,7 +23799,7 @@
                   <a:srgbClr val="000080"/>
                 </a:solidFill>
               </a:rPr>
-              <a:t>No word-writable files</a:t>
+              <a:t>No world-writable files</a:t>
             </a:r>
             <a:endParaRPr sz="2200">
               <a:solidFill>

</xml_diff>